<commit_message>
updated blog content images
</commit_message>
<xml_diff>
--- a/ppt/Presentation2.pptx
+++ b/ppt/Presentation2.pptx
@@ -17,6 +17,7 @@
     <p:sldId id="265" r:id="rId11"/>
     <p:sldId id="266" r:id="rId12"/>
     <p:sldId id="267" r:id="rId13"/>
+    <p:sldId id="268" r:id="rId14"/>
   </p:sldIdLst>
   <p:sldSz cx="12192000" cy="6858000"/>
   <p:notesSz cx="6858000" cy="9144000"/>
@@ -3547,31 +3548,95 @@
           </a:p>
         </p:txBody>
       </p:sp>
-      <p:sp>
-        <p:nvSpPr>
-          <p:cNvPr id="3" name="Content Placeholder 2">
-            <a:extLst>
-              <a:ext uri="{FF2B5EF4-FFF2-40B4-BE49-F238E27FC236}">
-                <a16:creationId xmlns:a16="http://schemas.microsoft.com/office/drawing/2014/main" id="{FA6C2E62-7F3B-8D48-AF56-ADA549C7E606}"/>
-              </a:ext>
-            </a:extLst>
-          </p:cNvPr>
-          <p:cNvSpPr>
-            <a:spLocks noGrp="1"/>
-          </p:cNvSpPr>
+      <p:pic>
+        <p:nvPicPr>
+          <p:cNvPr id="5" name="Content Placeholder 4" descr="A screenshot of a cell phone&#10;&#10;Description automatically generated">
+            <a:extLst>
+              <a:ext uri="{FF2B5EF4-FFF2-40B4-BE49-F238E27FC236}">
+                <a16:creationId xmlns:a16="http://schemas.microsoft.com/office/drawing/2014/main" id="{1CF84215-CCEB-7D46-A5D9-C7DEF865677B}"/>
+              </a:ext>
+            </a:extLst>
+          </p:cNvPr>
+          <p:cNvPicPr>
+            <a:picLocks noGrp="1" noChangeAspect="1"/>
+          </p:cNvPicPr>
           <p:nvPr>
             <p:ph idx="1"/>
           </p:nvPr>
-        </p:nvSpPr>
-        <p:spPr/>
-        <p:txBody>
-          <a:bodyPr/>
-          <a:lstStyle/>
-          <a:p>
-            <a:endParaRPr lang="en-US"/>
-          </a:p>
-        </p:txBody>
-      </p:sp>
+        </p:nvPicPr>
+        <p:blipFill>
+          <a:blip r:embed="rId2"/>
+          <a:stretch>
+            <a:fillRect/>
+          </a:stretch>
+        </p:blipFill>
+        <p:spPr>
+          <a:xfrm>
+            <a:off x="3965617" y="456676"/>
+            <a:ext cx="1071834" cy="6182712"/>
+          </a:xfrm>
+        </p:spPr>
+      </p:pic>
+      <p:pic>
+        <p:nvPicPr>
+          <p:cNvPr id="7" name="Picture 6" descr="A screenshot of a cell phone&#10;&#10;Description automatically generated">
+            <a:extLst>
+              <a:ext uri="{FF2B5EF4-FFF2-40B4-BE49-F238E27FC236}">
+                <a16:creationId xmlns:a16="http://schemas.microsoft.com/office/drawing/2014/main" id="{DA332804-19DB-1D4E-A4E9-AFBA8CBA853D}"/>
+              </a:ext>
+            </a:extLst>
+          </p:cNvPr>
+          <p:cNvPicPr>
+            <a:picLocks noChangeAspect="1"/>
+          </p:cNvPicPr>
+          <p:nvPr/>
+        </p:nvPicPr>
+        <p:blipFill>
+          <a:blip r:embed="rId3"/>
+          <a:stretch>
+            <a:fillRect/>
+          </a:stretch>
+        </p:blipFill>
+        <p:spPr>
+          <a:xfrm>
+            <a:off x="8097120" y="84273"/>
+            <a:ext cx="2974858" cy="6689454"/>
+          </a:xfrm>
+          <a:prstGeom prst="rect">
+            <a:avLst/>
+          </a:prstGeom>
+        </p:spPr>
+      </p:pic>
+      <p:pic>
+        <p:nvPicPr>
+          <p:cNvPr id="9" name="Picture 8" descr="A screenshot of a cell phone&#10;&#10;Description automatically generated">
+            <a:extLst>
+              <a:ext uri="{FF2B5EF4-FFF2-40B4-BE49-F238E27FC236}">
+                <a16:creationId xmlns:a16="http://schemas.microsoft.com/office/drawing/2014/main" id="{3A7F96BA-BA3D-BE4B-A33F-7813941C2A9E}"/>
+              </a:ext>
+            </a:extLst>
+          </p:cNvPr>
+          <p:cNvPicPr>
+            <a:picLocks noChangeAspect="1"/>
+          </p:cNvPicPr>
+          <p:nvPr/>
+        </p:nvPicPr>
+        <p:blipFill>
+          <a:blip r:embed="rId4"/>
+          <a:stretch>
+            <a:fillRect/>
+          </a:stretch>
+        </p:blipFill>
+        <p:spPr>
+          <a:xfrm>
+            <a:off x="5319273" y="365125"/>
+            <a:ext cx="2496025" cy="6317051"/>
+          </a:xfrm>
+          <a:prstGeom prst="rect">
+            <a:avLst/>
+          </a:prstGeom>
+        </p:spPr>
+      </p:pic>
     </p:spTree>
     <p:extLst>
       <p:ext uri="{BB962C8B-B14F-4D97-AF65-F5344CB8AC3E}">
@@ -3721,35 +3786,186 @@
           </a:p>
         </p:txBody>
       </p:sp>
-      <p:sp>
-        <p:nvSpPr>
-          <p:cNvPr id="3" name="Content Placeholder 2">
-            <a:extLst>
-              <a:ext uri="{FF2B5EF4-FFF2-40B4-BE49-F238E27FC236}">
-                <a16:creationId xmlns:a16="http://schemas.microsoft.com/office/drawing/2014/main" id="{EA95D9B3-CB8D-424B-831D-177A6C8A6285}"/>
-              </a:ext>
-            </a:extLst>
-          </p:cNvPr>
-          <p:cNvSpPr>
-            <a:spLocks noGrp="1"/>
-          </p:cNvSpPr>
+      <p:pic>
+        <p:nvPicPr>
+          <p:cNvPr id="5" name="Content Placeholder 4" descr="A screenshot of a cell phone&#10;&#10;Description automatically generated">
+            <a:extLst>
+              <a:ext uri="{FF2B5EF4-FFF2-40B4-BE49-F238E27FC236}">
+                <a16:creationId xmlns:a16="http://schemas.microsoft.com/office/drawing/2014/main" id="{19FDCE86-257D-AE46-9EBB-76267AA22870}"/>
+              </a:ext>
+            </a:extLst>
+          </p:cNvPr>
+          <p:cNvPicPr>
+            <a:picLocks noGrp="1" noChangeAspect="1"/>
+          </p:cNvPicPr>
           <p:nvPr>
             <p:ph idx="1"/>
           </p:nvPr>
-        </p:nvSpPr>
-        <p:spPr/>
-        <p:txBody>
-          <a:bodyPr/>
-          <a:lstStyle/>
-          <a:p>
-            <a:endParaRPr lang="en-US" dirty="0"/>
-          </a:p>
-        </p:txBody>
-      </p:sp>
+        </p:nvPicPr>
+        <p:blipFill>
+          <a:blip r:embed="rId2"/>
+          <a:stretch>
+            <a:fillRect/>
+          </a:stretch>
+        </p:blipFill>
+        <p:spPr>
+          <a:xfrm>
+            <a:off x="3307083" y="1253330"/>
+            <a:ext cx="1264788" cy="4351338"/>
+          </a:xfrm>
+        </p:spPr>
+      </p:pic>
+      <p:pic>
+        <p:nvPicPr>
+          <p:cNvPr id="7" name="Picture 6" descr="A screenshot of a cell phone&#10;&#10;Description automatically generated">
+            <a:extLst>
+              <a:ext uri="{FF2B5EF4-FFF2-40B4-BE49-F238E27FC236}">
+                <a16:creationId xmlns:a16="http://schemas.microsoft.com/office/drawing/2014/main" id="{A83E1F07-AAF5-154E-9399-F87FC4F44447}"/>
+              </a:ext>
+            </a:extLst>
+          </p:cNvPr>
+          <p:cNvPicPr>
+            <a:picLocks noChangeAspect="1"/>
+          </p:cNvPicPr>
+          <p:nvPr/>
+        </p:nvPicPr>
+        <p:blipFill>
+          <a:blip r:embed="rId3"/>
+          <a:stretch>
+            <a:fillRect/>
+          </a:stretch>
+        </p:blipFill>
+        <p:spPr>
+          <a:xfrm>
+            <a:off x="7483028" y="126806"/>
+            <a:ext cx="3672923" cy="6604387"/>
+          </a:xfrm>
+          <a:prstGeom prst="rect">
+            <a:avLst/>
+          </a:prstGeom>
+        </p:spPr>
+      </p:pic>
+      <p:pic>
+        <p:nvPicPr>
+          <p:cNvPr id="9" name="Picture 8" descr="A screenshot of a cell phone&#10;&#10;Description automatically generated">
+            <a:extLst>
+              <a:ext uri="{FF2B5EF4-FFF2-40B4-BE49-F238E27FC236}">
+                <a16:creationId xmlns:a16="http://schemas.microsoft.com/office/drawing/2014/main" id="{850E315E-51B1-9141-ADE3-55E9AF26CACA}"/>
+              </a:ext>
+            </a:extLst>
+          </p:cNvPr>
+          <p:cNvPicPr>
+            <a:picLocks noChangeAspect="1"/>
+          </p:cNvPicPr>
+          <p:nvPr/>
+        </p:nvPicPr>
+        <p:blipFill>
+          <a:blip r:embed="rId4"/>
+          <a:stretch>
+            <a:fillRect/>
+          </a:stretch>
+        </p:blipFill>
+        <p:spPr>
+          <a:xfrm>
+            <a:off x="4708973" y="405433"/>
+            <a:ext cx="2499850" cy="6326730"/>
+          </a:xfrm>
+          <a:prstGeom prst="rect">
+            <a:avLst/>
+          </a:prstGeom>
+        </p:spPr>
+      </p:pic>
     </p:spTree>
     <p:extLst>
       <p:ext uri="{BB962C8B-B14F-4D97-AF65-F5344CB8AC3E}">
         <p14:creationId xmlns:p14="http://schemas.microsoft.com/office/powerpoint/2010/main" val="1841826186"/>
+      </p:ext>
+    </p:extLst>
+  </p:cSld>
+  <p:clrMapOvr>
+    <a:masterClrMapping/>
+  </p:clrMapOvr>
+</p:sld>
+</file>
+
+<file path=ppt/slides/slide13.xml><?xml version="1.0" encoding="utf-8"?>
+<p:sld xmlns:a="http://schemas.openxmlformats.org/drawingml/2006/main" xmlns:r="http://schemas.openxmlformats.org/officeDocument/2006/relationships" xmlns:p="http://schemas.openxmlformats.org/presentationml/2006/main">
+  <p:cSld>
+    <p:spTree>
+      <p:nvGrpSpPr>
+        <p:cNvPr id="1" name=""/>
+        <p:cNvGrpSpPr/>
+        <p:nvPr/>
+      </p:nvGrpSpPr>
+      <p:grpSpPr>
+        <a:xfrm>
+          <a:off x="0" y="0"/>
+          <a:ext cx="0" cy="0"/>
+          <a:chOff x="0" y="0"/>
+          <a:chExt cx="0" cy="0"/>
+        </a:xfrm>
+      </p:grpSpPr>
+      <p:sp>
+        <p:nvSpPr>
+          <p:cNvPr id="2" name="Title 1">
+            <a:extLst>
+              <a:ext uri="{FF2B5EF4-FFF2-40B4-BE49-F238E27FC236}">
+                <a16:creationId xmlns:a16="http://schemas.microsoft.com/office/drawing/2014/main" id="{3534B52F-B380-BE48-A1C0-0FCC4754FDCD}"/>
+              </a:ext>
+            </a:extLst>
+          </p:cNvPr>
+          <p:cNvSpPr>
+            <a:spLocks noGrp="1"/>
+          </p:cNvSpPr>
+          <p:nvPr>
+            <p:ph type="title"/>
+          </p:nvPr>
+        </p:nvSpPr>
+        <p:spPr/>
+        <p:txBody>
+          <a:bodyPr/>
+          <a:lstStyle/>
+          <a:p>
+            <a:r>
+              <a:rPr lang="en-US" dirty="0">
+                <a:latin typeface="Big Caslon Medium" panose="02000603090000020003" pitchFamily="2" charset="-79"/>
+                <a:cs typeface="Big Caslon Medium" panose="02000603090000020003" pitchFamily="2" charset="-79"/>
+              </a:rPr>
+              <a:t>Blog Posts</a:t>
+            </a:r>
+            <a:endParaRPr lang="en-US" dirty="0"/>
+          </a:p>
+        </p:txBody>
+      </p:sp>
+      <p:sp>
+        <p:nvSpPr>
+          <p:cNvPr id="3" name="Content Placeholder 2">
+            <a:extLst>
+              <a:ext uri="{FF2B5EF4-FFF2-40B4-BE49-F238E27FC236}">
+                <a16:creationId xmlns:a16="http://schemas.microsoft.com/office/drawing/2014/main" id="{D8FB4D8C-7F61-DA44-A87F-DAD0B97E86B3}"/>
+              </a:ext>
+            </a:extLst>
+          </p:cNvPr>
+          <p:cNvSpPr>
+            <a:spLocks noGrp="1"/>
+          </p:cNvSpPr>
+          <p:nvPr>
+            <p:ph idx="1"/>
+          </p:nvPr>
+        </p:nvSpPr>
+        <p:spPr/>
+        <p:txBody>
+          <a:bodyPr/>
+          <a:lstStyle/>
+          <a:p>
+            <a:endParaRPr lang="en-US"/>
+          </a:p>
+        </p:txBody>
+      </p:sp>
+    </p:spTree>
+    <p:extLst>
+      <p:ext uri="{BB962C8B-B14F-4D97-AF65-F5344CB8AC3E}">
+        <p14:creationId xmlns:p14="http://schemas.microsoft.com/office/powerpoint/2010/main" val="1691307814"/>
       </p:ext>
     </p:extLst>
   </p:cSld>
@@ -5258,31 +5474,95 @@
           </a:p>
         </p:txBody>
       </p:sp>
-      <p:sp>
-        <p:nvSpPr>
-          <p:cNvPr id="3" name="Content Placeholder 2">
-            <a:extLst>
-              <a:ext uri="{FF2B5EF4-FFF2-40B4-BE49-F238E27FC236}">
-                <a16:creationId xmlns:a16="http://schemas.microsoft.com/office/drawing/2014/main" id="{C0DAA613-062B-EA4D-96E6-67A6776C436B}"/>
-              </a:ext>
-            </a:extLst>
-          </p:cNvPr>
-          <p:cNvSpPr>
-            <a:spLocks noGrp="1"/>
-          </p:cNvSpPr>
+      <p:pic>
+        <p:nvPicPr>
+          <p:cNvPr id="5" name="Content Placeholder 4" descr="A screenshot of a cell phone&#10;&#10;Description automatically generated">
+            <a:extLst>
+              <a:ext uri="{FF2B5EF4-FFF2-40B4-BE49-F238E27FC236}">
+                <a16:creationId xmlns:a16="http://schemas.microsoft.com/office/drawing/2014/main" id="{DB72E19E-6E4B-B445-AF20-A554C9EF20E6}"/>
+              </a:ext>
+            </a:extLst>
+          </p:cNvPr>
+          <p:cNvPicPr>
+            <a:picLocks noGrp="1" noChangeAspect="1"/>
+          </p:cNvPicPr>
           <p:nvPr>
             <p:ph idx="1"/>
           </p:nvPr>
-        </p:nvSpPr>
-        <p:spPr/>
-        <p:txBody>
-          <a:bodyPr/>
-          <a:lstStyle/>
-          <a:p>
-            <a:endParaRPr lang="en-US"/>
-          </a:p>
-        </p:txBody>
-      </p:sp>
+        </p:nvPicPr>
+        <p:blipFill>
+          <a:blip r:embed="rId2"/>
+          <a:stretch>
+            <a:fillRect/>
+          </a:stretch>
+        </p:blipFill>
+        <p:spPr>
+          <a:xfrm>
+            <a:off x="4005950" y="465038"/>
+            <a:ext cx="1334510" cy="5754310"/>
+          </a:xfrm>
+        </p:spPr>
+      </p:pic>
+      <p:pic>
+        <p:nvPicPr>
+          <p:cNvPr id="7" name="Picture 6" descr="A screenshot of a cell phone&#10;&#10;Description automatically generated">
+            <a:extLst>
+              <a:ext uri="{FF2B5EF4-FFF2-40B4-BE49-F238E27FC236}">
+                <a16:creationId xmlns:a16="http://schemas.microsoft.com/office/drawing/2014/main" id="{2250C0E8-6E6A-6549-99DD-D09C910C203D}"/>
+              </a:ext>
+            </a:extLst>
+          </p:cNvPr>
+          <p:cNvPicPr>
+            <a:picLocks noChangeAspect="1"/>
+          </p:cNvPicPr>
+          <p:nvPr/>
+        </p:nvPicPr>
+        <p:blipFill>
+          <a:blip r:embed="rId3"/>
+          <a:stretch>
+            <a:fillRect/>
+          </a:stretch>
+        </p:blipFill>
+        <p:spPr>
+          <a:xfrm>
+            <a:off x="8156314" y="0"/>
+            <a:ext cx="2972604" cy="6684386"/>
+          </a:xfrm>
+          <a:prstGeom prst="rect">
+            <a:avLst/>
+          </a:prstGeom>
+        </p:spPr>
+      </p:pic>
+      <p:pic>
+        <p:nvPicPr>
+          <p:cNvPr id="9" name="Picture 8" descr="A screenshot of a cell phone&#10;&#10;Description automatically generated">
+            <a:extLst>
+              <a:ext uri="{FF2B5EF4-FFF2-40B4-BE49-F238E27FC236}">
+                <a16:creationId xmlns:a16="http://schemas.microsoft.com/office/drawing/2014/main" id="{F82F2CA4-BA9C-A247-AD27-150A0035C39F}"/>
+              </a:ext>
+            </a:extLst>
+          </p:cNvPr>
+          <p:cNvPicPr>
+            <a:picLocks noChangeAspect="1"/>
+          </p:cNvPicPr>
+          <p:nvPr/>
+        </p:nvPicPr>
+        <p:blipFill>
+          <a:blip r:embed="rId4"/>
+          <a:stretch>
+            <a:fillRect/>
+          </a:stretch>
+        </p:blipFill>
+        <p:spPr>
+          <a:xfrm>
+            <a:off x="5565342" y="348091"/>
+            <a:ext cx="2366090" cy="5988204"/>
+          </a:xfrm>
+          <a:prstGeom prst="rect">
+            <a:avLst/>
+          </a:prstGeom>
+        </p:spPr>
+      </p:pic>
     </p:spTree>
     <p:extLst>
       <p:ext uri="{BB962C8B-B14F-4D97-AF65-F5344CB8AC3E}">
@@ -5345,31 +5625,95 @@
           </a:p>
         </p:txBody>
       </p:sp>
-      <p:sp>
-        <p:nvSpPr>
-          <p:cNvPr id="3" name="Content Placeholder 2">
-            <a:extLst>
-              <a:ext uri="{FF2B5EF4-FFF2-40B4-BE49-F238E27FC236}">
-                <a16:creationId xmlns:a16="http://schemas.microsoft.com/office/drawing/2014/main" id="{4A758C0C-AD41-D34E-AB00-CA593868B7F2}"/>
-              </a:ext>
-            </a:extLst>
-          </p:cNvPr>
-          <p:cNvSpPr>
-            <a:spLocks noGrp="1"/>
-          </p:cNvSpPr>
+      <p:pic>
+        <p:nvPicPr>
+          <p:cNvPr id="5" name="Content Placeholder 4" descr="A screenshot of a cell phone&#10;&#10;Description automatically generated">
+            <a:extLst>
+              <a:ext uri="{FF2B5EF4-FFF2-40B4-BE49-F238E27FC236}">
+                <a16:creationId xmlns:a16="http://schemas.microsoft.com/office/drawing/2014/main" id="{D51FBB6D-3636-8F46-B8D6-81F0084E01EC}"/>
+              </a:ext>
+            </a:extLst>
+          </p:cNvPr>
+          <p:cNvPicPr>
+            <a:picLocks noGrp="1" noChangeAspect="1"/>
+          </p:cNvPicPr>
           <p:nvPr>
             <p:ph idx="1"/>
           </p:nvPr>
-        </p:nvSpPr>
-        <p:spPr/>
-        <p:txBody>
-          <a:bodyPr/>
-          <a:lstStyle/>
-          <a:p>
-            <a:endParaRPr lang="en-US"/>
-          </a:p>
-        </p:txBody>
-      </p:sp>
+        </p:nvPicPr>
+        <p:blipFill>
+          <a:blip r:embed="rId2"/>
+          <a:stretch>
+            <a:fillRect/>
+          </a:stretch>
+        </p:blipFill>
+        <p:spPr>
+          <a:xfrm>
+            <a:off x="3903325" y="924999"/>
+            <a:ext cx="1217510" cy="5249814"/>
+          </a:xfrm>
+        </p:spPr>
+      </p:pic>
+      <p:pic>
+        <p:nvPicPr>
+          <p:cNvPr id="7" name="Picture 6" descr="A screenshot of a cell phone&#10;&#10;Description automatically generated">
+            <a:extLst>
+              <a:ext uri="{FF2B5EF4-FFF2-40B4-BE49-F238E27FC236}">
+                <a16:creationId xmlns:a16="http://schemas.microsoft.com/office/drawing/2014/main" id="{B9E59254-054A-1D43-A3EC-4C08146516CE}"/>
+              </a:ext>
+            </a:extLst>
+          </p:cNvPr>
+          <p:cNvPicPr>
+            <a:picLocks noChangeAspect="1"/>
+          </p:cNvPicPr>
+          <p:nvPr/>
+        </p:nvPicPr>
+        <p:blipFill>
+          <a:blip r:embed="rId3"/>
+          <a:stretch>
+            <a:fillRect/>
+          </a:stretch>
+        </p:blipFill>
+        <p:spPr>
+          <a:xfrm>
+            <a:off x="8200859" y="0"/>
+            <a:ext cx="2979112" cy="6699019"/>
+          </a:xfrm>
+          <a:prstGeom prst="rect">
+            <a:avLst/>
+          </a:prstGeom>
+        </p:spPr>
+      </p:pic>
+      <p:pic>
+        <p:nvPicPr>
+          <p:cNvPr id="9" name="Picture 8" descr="A screenshot of a cell phone&#10;&#10;Description automatically generated">
+            <a:extLst>
+              <a:ext uri="{FF2B5EF4-FFF2-40B4-BE49-F238E27FC236}">
+                <a16:creationId xmlns:a16="http://schemas.microsoft.com/office/drawing/2014/main" id="{B956535C-7774-2146-B54E-391EEA5BBA71}"/>
+              </a:ext>
+            </a:extLst>
+          </p:cNvPr>
+          <p:cNvPicPr>
+            <a:picLocks noChangeAspect="1"/>
+          </p:cNvPicPr>
+          <p:nvPr/>
+        </p:nvPicPr>
+        <p:blipFill>
+          <a:blip r:embed="rId4"/>
+          <a:stretch>
+            <a:fillRect/>
+          </a:stretch>
+        </p:blipFill>
+        <p:spPr>
+          <a:xfrm>
+            <a:off x="5294664" y="158982"/>
+            <a:ext cx="2646950" cy="6699018"/>
+          </a:xfrm>
+          <a:prstGeom prst="rect">
+            <a:avLst/>
+          </a:prstGeom>
+        </p:spPr>
+      </p:pic>
     </p:spTree>
     <p:extLst>
       <p:ext uri="{BB962C8B-B14F-4D97-AF65-F5344CB8AC3E}">

</xml_diff>